<commit_message>
Added total data size.  Worth 7 points on grade
</commit_message>
<xml_diff>
--- a/NYSE Analysis With MySQL.pptx
+++ b/NYSE Analysis With MySQL.pptx
@@ -10082,6 +10082,20 @@
             <a:pPr marL="0" indent="0">
               <a:buNone/>
             </a:pPr>
+            <a:r>
+              <a:rPr lang="en-US" sz="2400" dirty="0"/>
+              <a:t>Total </a:t>
+            </a:r>
+            <a:r>
+              <a:rPr lang="en-US" sz="2400"/>
+              <a:t>Data size is 103.6MB</a:t>
+            </a:r>
+            <a:endParaRPr lang="en-US" sz="2400" dirty="0"/>
+          </a:p>
+          <a:p>
+            <a:pPr marL="0" indent="0">
+              <a:buNone/>
+            </a:pPr>
             <a:endParaRPr lang="en-US" sz="2400" dirty="0"/>
           </a:p>
           <a:p>

</xml_diff>

<commit_message>
Update Growth v Volatility image
</commit_message>
<xml_diff>
--- a/NYSE Analysis With MySQL.pptx
+++ b/NYSE Analysis With MySQL.pptx
@@ -4,6 +4,9 @@
   <p:sldMasterIdLst>
     <p:sldMasterId id="2147483710" r:id="rId1"/>
   </p:sldMasterIdLst>
+  <p:notesMasterIdLst>
+    <p:notesMasterId r:id="rId19"/>
+  </p:notesMasterIdLst>
   <p:sldIdLst>
     <p:sldId id="256" r:id="rId2"/>
     <p:sldId id="257" r:id="rId3"/>
@@ -132,6 +135,608 @@
 <p1510:revInfo xmlns:a="http://schemas.openxmlformats.org/drawingml/2006/main" xmlns:r="http://schemas.openxmlformats.org/officeDocument/2006/relationships" xmlns:p1510="http://schemas.microsoft.com/office/powerpoint/2015/10/main"/>
 </file>
 
+<file path=ppt/notesMasters/notesMaster1.xml><?xml version="1.0" encoding="utf-8"?>
+<p:notesMaster xmlns:a="http://schemas.openxmlformats.org/drawingml/2006/main" xmlns:r="http://schemas.openxmlformats.org/officeDocument/2006/relationships" xmlns:p="http://schemas.openxmlformats.org/presentationml/2006/main">
+  <p:cSld>
+    <p:bg>
+      <p:bgRef idx="1001">
+        <a:schemeClr val="bg1"/>
+      </p:bgRef>
+    </p:bg>
+    <p:spTree>
+      <p:nvGrpSpPr>
+        <p:cNvPr id="1" name=""/>
+        <p:cNvGrpSpPr/>
+        <p:nvPr/>
+      </p:nvGrpSpPr>
+      <p:grpSpPr>
+        <a:xfrm>
+          <a:off x="0" y="0"/>
+          <a:ext cx="0" cy="0"/>
+          <a:chOff x="0" y="0"/>
+          <a:chExt cx="0" cy="0"/>
+        </a:xfrm>
+      </p:grpSpPr>
+      <p:sp>
+        <p:nvSpPr>
+          <p:cNvPr id="2" name="Header Placeholder 1"/>
+          <p:cNvSpPr>
+            <a:spLocks noGrp="1"/>
+          </p:cNvSpPr>
+          <p:nvPr>
+            <p:ph type="hdr" sz="quarter"/>
+          </p:nvPr>
+        </p:nvSpPr>
+        <p:spPr>
+          <a:xfrm>
+            <a:off x="0" y="0"/>
+            <a:ext cx="2971800" cy="458788"/>
+          </a:xfrm>
+          <a:prstGeom prst="rect">
+            <a:avLst/>
+          </a:prstGeom>
+        </p:spPr>
+        <p:txBody>
+          <a:bodyPr vert="horz" lIns="91440" tIns="45720" rIns="91440" bIns="45720" rtlCol="0"/>
+          <a:lstStyle>
+            <a:lvl1pPr algn="l">
+              <a:defRPr sz="1200"/>
+            </a:lvl1pPr>
+          </a:lstStyle>
+          <a:p>
+            <a:endParaRPr lang="en-US"/>
+          </a:p>
+        </p:txBody>
+      </p:sp>
+      <p:sp>
+        <p:nvSpPr>
+          <p:cNvPr id="3" name="Date Placeholder 2"/>
+          <p:cNvSpPr>
+            <a:spLocks noGrp="1"/>
+          </p:cNvSpPr>
+          <p:nvPr>
+            <p:ph type="dt" idx="1"/>
+          </p:nvPr>
+        </p:nvSpPr>
+        <p:spPr>
+          <a:xfrm>
+            <a:off x="3884613" y="0"/>
+            <a:ext cx="2971800" cy="458788"/>
+          </a:xfrm>
+          <a:prstGeom prst="rect">
+            <a:avLst/>
+          </a:prstGeom>
+        </p:spPr>
+        <p:txBody>
+          <a:bodyPr vert="horz" lIns="91440" tIns="45720" rIns="91440" bIns="45720" rtlCol="0"/>
+          <a:lstStyle>
+            <a:lvl1pPr algn="r">
+              <a:defRPr sz="1200"/>
+            </a:lvl1pPr>
+          </a:lstStyle>
+          <a:p>
+            <a:fld id="{686EA775-9A7D-5143-8247-26F85215B26A}" type="datetimeFigureOut">
+              <a:rPr lang="en-US" smtClean="0"/>
+              <a:t>8/14/17</a:t>
+            </a:fld>
+            <a:endParaRPr lang="en-US"/>
+          </a:p>
+        </p:txBody>
+      </p:sp>
+      <p:sp>
+        <p:nvSpPr>
+          <p:cNvPr id="4" name="Slide Image Placeholder 3"/>
+          <p:cNvSpPr>
+            <a:spLocks noGrp="1" noRot="1" noChangeAspect="1"/>
+          </p:cNvSpPr>
+          <p:nvPr>
+            <p:ph type="sldImg" idx="2"/>
+          </p:nvPr>
+        </p:nvSpPr>
+        <p:spPr>
+          <a:xfrm>
+            <a:off x="685800" y="1143000"/>
+            <a:ext cx="5486400" cy="3086100"/>
+          </a:xfrm>
+          <a:prstGeom prst="rect">
+            <a:avLst/>
+          </a:prstGeom>
+          <a:noFill/>
+          <a:ln w="12700">
+            <a:solidFill>
+              <a:prstClr val="black"/>
+            </a:solidFill>
+          </a:ln>
+        </p:spPr>
+        <p:txBody>
+          <a:bodyPr vert="horz" lIns="91440" tIns="45720" rIns="91440" bIns="45720" rtlCol="0" anchor="ctr"/>
+          <a:lstStyle/>
+          <a:p>
+            <a:endParaRPr lang="en-US"/>
+          </a:p>
+        </p:txBody>
+      </p:sp>
+      <p:sp>
+        <p:nvSpPr>
+          <p:cNvPr id="5" name="Notes Placeholder 4"/>
+          <p:cNvSpPr>
+            <a:spLocks noGrp="1"/>
+          </p:cNvSpPr>
+          <p:nvPr>
+            <p:ph type="body" sz="quarter" idx="3"/>
+          </p:nvPr>
+        </p:nvSpPr>
+        <p:spPr>
+          <a:xfrm>
+            <a:off x="685800" y="4400550"/>
+            <a:ext cx="5486400" cy="3600450"/>
+          </a:xfrm>
+          <a:prstGeom prst="rect">
+            <a:avLst/>
+          </a:prstGeom>
+        </p:spPr>
+        <p:txBody>
+          <a:bodyPr vert="horz" lIns="91440" tIns="45720" rIns="91440" bIns="45720" rtlCol="0"/>
+          <a:lstStyle/>
+          <a:p>
+            <a:pPr lvl="0"/>
+            <a:r>
+              <a:rPr lang="en-US" smtClean="0"/>
+              <a:t>Click to edit Master text styles</a:t>
+            </a:r>
+          </a:p>
+          <a:p>
+            <a:pPr lvl="1"/>
+            <a:r>
+              <a:rPr lang="en-US" smtClean="0"/>
+              <a:t>Second level</a:t>
+            </a:r>
+          </a:p>
+          <a:p>
+            <a:pPr lvl="2"/>
+            <a:r>
+              <a:rPr lang="en-US" smtClean="0"/>
+              <a:t>Third level</a:t>
+            </a:r>
+          </a:p>
+          <a:p>
+            <a:pPr lvl="3"/>
+            <a:r>
+              <a:rPr lang="en-US" smtClean="0"/>
+              <a:t>Fourth level</a:t>
+            </a:r>
+          </a:p>
+          <a:p>
+            <a:pPr lvl="4"/>
+            <a:r>
+              <a:rPr lang="en-US" smtClean="0"/>
+              <a:t>Fifth level</a:t>
+            </a:r>
+            <a:endParaRPr lang="en-US"/>
+          </a:p>
+        </p:txBody>
+      </p:sp>
+      <p:sp>
+        <p:nvSpPr>
+          <p:cNvPr id="6" name="Footer Placeholder 5"/>
+          <p:cNvSpPr>
+            <a:spLocks noGrp="1"/>
+          </p:cNvSpPr>
+          <p:nvPr>
+            <p:ph type="ftr" sz="quarter" idx="4"/>
+          </p:nvPr>
+        </p:nvSpPr>
+        <p:spPr>
+          <a:xfrm>
+            <a:off x="0" y="8685213"/>
+            <a:ext cx="2971800" cy="458787"/>
+          </a:xfrm>
+          <a:prstGeom prst="rect">
+            <a:avLst/>
+          </a:prstGeom>
+        </p:spPr>
+        <p:txBody>
+          <a:bodyPr vert="horz" lIns="91440" tIns="45720" rIns="91440" bIns="45720" rtlCol="0" anchor="b"/>
+          <a:lstStyle>
+            <a:lvl1pPr algn="l">
+              <a:defRPr sz="1200"/>
+            </a:lvl1pPr>
+          </a:lstStyle>
+          <a:p>
+            <a:endParaRPr lang="en-US"/>
+          </a:p>
+        </p:txBody>
+      </p:sp>
+      <p:sp>
+        <p:nvSpPr>
+          <p:cNvPr id="7" name="Slide Number Placeholder 6"/>
+          <p:cNvSpPr>
+            <a:spLocks noGrp="1"/>
+          </p:cNvSpPr>
+          <p:nvPr>
+            <p:ph type="sldNum" sz="quarter" idx="5"/>
+          </p:nvPr>
+        </p:nvSpPr>
+        <p:spPr>
+          <a:xfrm>
+            <a:off x="3884613" y="8685213"/>
+            <a:ext cx="2971800" cy="458787"/>
+          </a:xfrm>
+          <a:prstGeom prst="rect">
+            <a:avLst/>
+          </a:prstGeom>
+        </p:spPr>
+        <p:txBody>
+          <a:bodyPr vert="horz" lIns="91440" tIns="45720" rIns="91440" bIns="45720" rtlCol="0" anchor="b"/>
+          <a:lstStyle>
+            <a:lvl1pPr algn="r">
+              <a:defRPr sz="1200"/>
+            </a:lvl1pPr>
+          </a:lstStyle>
+          <a:p>
+            <a:fld id="{90065BF4-54B7-ED4B-BAB6-0FA6251F32CC}" type="slidenum">
+              <a:rPr lang="en-US" smtClean="0"/>
+              <a:t>‹#›</a:t>
+            </a:fld>
+            <a:endParaRPr lang="en-US"/>
+          </a:p>
+        </p:txBody>
+      </p:sp>
+    </p:spTree>
+    <p:extLst>
+      <p:ext uri="{BB962C8B-B14F-4D97-AF65-F5344CB8AC3E}">
+        <p14:creationId xmlns:p14="http://schemas.microsoft.com/office/powerpoint/2010/main" val="2039084491"/>
+      </p:ext>
+    </p:extLst>
+  </p:cSld>
+  <p:clrMap bg1="lt1" tx1="dk1" bg2="lt2" tx2="dk2" accent1="accent1" accent2="accent2" accent3="accent3" accent4="accent4" accent5="accent5" accent6="accent6" hlink="hlink" folHlink="folHlink"/>
+  <p:notesStyle>
+    <a:lvl1pPr marL="0" algn="l" defTabSz="914400" rtl="0" eaLnBrk="1" latinLnBrk="0" hangingPunct="1">
+      <a:defRPr sz="1200" kern="1200">
+        <a:solidFill>
+          <a:schemeClr val="tx1"/>
+        </a:solidFill>
+        <a:latin typeface="+mn-lt"/>
+        <a:ea typeface="+mn-ea"/>
+        <a:cs typeface="+mn-cs"/>
+      </a:defRPr>
+    </a:lvl1pPr>
+    <a:lvl2pPr marL="457200" algn="l" defTabSz="914400" rtl="0" eaLnBrk="1" latinLnBrk="0" hangingPunct="1">
+      <a:defRPr sz="1200" kern="1200">
+        <a:solidFill>
+          <a:schemeClr val="tx1"/>
+        </a:solidFill>
+        <a:latin typeface="+mn-lt"/>
+        <a:ea typeface="+mn-ea"/>
+        <a:cs typeface="+mn-cs"/>
+      </a:defRPr>
+    </a:lvl2pPr>
+    <a:lvl3pPr marL="914400" algn="l" defTabSz="914400" rtl="0" eaLnBrk="1" latinLnBrk="0" hangingPunct="1">
+      <a:defRPr sz="1200" kern="1200">
+        <a:solidFill>
+          <a:schemeClr val="tx1"/>
+        </a:solidFill>
+        <a:latin typeface="+mn-lt"/>
+        <a:ea typeface="+mn-ea"/>
+        <a:cs typeface="+mn-cs"/>
+      </a:defRPr>
+    </a:lvl3pPr>
+    <a:lvl4pPr marL="1371600" algn="l" defTabSz="914400" rtl="0" eaLnBrk="1" latinLnBrk="0" hangingPunct="1">
+      <a:defRPr sz="1200" kern="1200">
+        <a:solidFill>
+          <a:schemeClr val="tx1"/>
+        </a:solidFill>
+        <a:latin typeface="+mn-lt"/>
+        <a:ea typeface="+mn-ea"/>
+        <a:cs typeface="+mn-cs"/>
+      </a:defRPr>
+    </a:lvl4pPr>
+    <a:lvl5pPr marL="1828800" algn="l" defTabSz="914400" rtl="0" eaLnBrk="1" latinLnBrk="0" hangingPunct="1">
+      <a:defRPr sz="1200" kern="1200">
+        <a:solidFill>
+          <a:schemeClr val="tx1"/>
+        </a:solidFill>
+        <a:latin typeface="+mn-lt"/>
+        <a:ea typeface="+mn-ea"/>
+        <a:cs typeface="+mn-cs"/>
+      </a:defRPr>
+    </a:lvl5pPr>
+    <a:lvl6pPr marL="2286000" algn="l" defTabSz="914400" rtl="0" eaLnBrk="1" latinLnBrk="0" hangingPunct="1">
+      <a:defRPr sz="1200" kern="1200">
+        <a:solidFill>
+          <a:schemeClr val="tx1"/>
+        </a:solidFill>
+        <a:latin typeface="+mn-lt"/>
+        <a:ea typeface="+mn-ea"/>
+        <a:cs typeface="+mn-cs"/>
+      </a:defRPr>
+    </a:lvl6pPr>
+    <a:lvl7pPr marL="2743200" algn="l" defTabSz="914400" rtl="0" eaLnBrk="1" latinLnBrk="0" hangingPunct="1">
+      <a:defRPr sz="1200" kern="1200">
+        <a:solidFill>
+          <a:schemeClr val="tx1"/>
+        </a:solidFill>
+        <a:latin typeface="+mn-lt"/>
+        <a:ea typeface="+mn-ea"/>
+        <a:cs typeface="+mn-cs"/>
+      </a:defRPr>
+    </a:lvl7pPr>
+    <a:lvl8pPr marL="3200400" algn="l" defTabSz="914400" rtl="0" eaLnBrk="1" latinLnBrk="0" hangingPunct="1">
+      <a:defRPr sz="1200" kern="1200">
+        <a:solidFill>
+          <a:schemeClr val="tx1"/>
+        </a:solidFill>
+        <a:latin typeface="+mn-lt"/>
+        <a:ea typeface="+mn-ea"/>
+        <a:cs typeface="+mn-cs"/>
+      </a:defRPr>
+    </a:lvl8pPr>
+    <a:lvl9pPr marL="3657600" algn="l" defTabSz="914400" rtl="0" eaLnBrk="1" latinLnBrk="0" hangingPunct="1">
+      <a:defRPr sz="1200" kern="1200">
+        <a:solidFill>
+          <a:schemeClr val="tx1"/>
+        </a:solidFill>
+        <a:latin typeface="+mn-lt"/>
+        <a:ea typeface="+mn-ea"/>
+        <a:cs typeface="+mn-cs"/>
+      </a:defRPr>
+    </a:lvl9pPr>
+  </p:notesStyle>
+</p:notesMaster>
+</file>
+
+<file path=ppt/notesSlides/notesSlide1.xml><?xml version="1.0" encoding="utf-8"?>
+<p:notes xmlns:a="http://schemas.openxmlformats.org/drawingml/2006/main" xmlns:r="http://schemas.openxmlformats.org/officeDocument/2006/relationships" xmlns:p="http://schemas.openxmlformats.org/presentationml/2006/main">
+  <p:cSld>
+    <p:spTree>
+      <p:nvGrpSpPr>
+        <p:cNvPr id="1" name=""/>
+        <p:cNvGrpSpPr/>
+        <p:nvPr/>
+      </p:nvGrpSpPr>
+      <p:grpSpPr>
+        <a:xfrm>
+          <a:off x="0" y="0"/>
+          <a:ext cx="0" cy="0"/>
+          <a:chOff x="0" y="0"/>
+          <a:chExt cx="0" cy="0"/>
+        </a:xfrm>
+      </p:grpSpPr>
+      <p:sp>
+        <p:nvSpPr>
+          <p:cNvPr id="2" name="Slide Image Placeholder 1"/>
+          <p:cNvSpPr>
+            <a:spLocks noGrp="1" noRot="1" noChangeAspect="1"/>
+          </p:cNvSpPr>
+          <p:nvPr>
+            <p:ph type="sldImg"/>
+          </p:nvPr>
+        </p:nvSpPr>
+        <p:spPr/>
+      </p:sp>
+      <p:sp>
+        <p:nvSpPr>
+          <p:cNvPr id="3" name="Notes Placeholder 2"/>
+          <p:cNvSpPr>
+            <a:spLocks noGrp="1"/>
+          </p:cNvSpPr>
+          <p:nvPr>
+            <p:ph type="body" idx="1"/>
+          </p:nvPr>
+        </p:nvSpPr>
+        <p:spPr/>
+        <p:txBody>
+          <a:bodyPr/>
+          <a:lstStyle/>
+          <a:p>
+            <a:endParaRPr lang="en-US" dirty="0"/>
+          </a:p>
+        </p:txBody>
+      </p:sp>
+      <p:sp>
+        <p:nvSpPr>
+          <p:cNvPr id="4" name="Slide Number Placeholder 3"/>
+          <p:cNvSpPr>
+            <a:spLocks noGrp="1"/>
+          </p:cNvSpPr>
+          <p:nvPr>
+            <p:ph type="sldNum" sz="quarter" idx="10"/>
+          </p:nvPr>
+        </p:nvSpPr>
+        <p:spPr/>
+        <p:txBody>
+          <a:bodyPr/>
+          <a:lstStyle/>
+          <a:p>
+            <a:fld id="{90065BF4-54B7-ED4B-BAB6-0FA6251F32CC}" type="slidenum">
+              <a:rPr lang="en-US" smtClean="0"/>
+              <a:t>9</a:t>
+            </a:fld>
+            <a:endParaRPr lang="en-US"/>
+          </a:p>
+        </p:txBody>
+      </p:sp>
+    </p:spTree>
+    <p:extLst>
+      <p:ext uri="{BB962C8B-B14F-4D97-AF65-F5344CB8AC3E}">
+        <p14:creationId xmlns:p14="http://schemas.microsoft.com/office/powerpoint/2010/main" val="15115840"/>
+      </p:ext>
+    </p:extLst>
+  </p:cSld>
+  <p:clrMapOvr>
+    <a:masterClrMapping/>
+  </p:clrMapOvr>
+</p:notes>
+</file>
+
+<file path=ppt/notesSlides/notesSlide2.xml><?xml version="1.0" encoding="utf-8"?>
+<p:notes xmlns:a="http://schemas.openxmlformats.org/drawingml/2006/main" xmlns:r="http://schemas.openxmlformats.org/officeDocument/2006/relationships" xmlns:p="http://schemas.openxmlformats.org/presentationml/2006/main">
+  <p:cSld>
+    <p:spTree>
+      <p:nvGrpSpPr>
+        <p:cNvPr id="1" name=""/>
+        <p:cNvGrpSpPr/>
+        <p:nvPr/>
+      </p:nvGrpSpPr>
+      <p:grpSpPr>
+        <a:xfrm>
+          <a:off x="0" y="0"/>
+          <a:ext cx="0" cy="0"/>
+          <a:chOff x="0" y="0"/>
+          <a:chExt cx="0" cy="0"/>
+        </a:xfrm>
+      </p:grpSpPr>
+      <p:sp>
+        <p:nvSpPr>
+          <p:cNvPr id="2" name="Slide Image Placeholder 1"/>
+          <p:cNvSpPr>
+            <a:spLocks noGrp="1" noRot="1" noChangeAspect="1"/>
+          </p:cNvSpPr>
+          <p:nvPr>
+            <p:ph type="sldImg"/>
+          </p:nvPr>
+        </p:nvSpPr>
+        <p:spPr/>
+      </p:sp>
+      <p:sp>
+        <p:nvSpPr>
+          <p:cNvPr id="3" name="Notes Placeholder 2"/>
+          <p:cNvSpPr>
+            <a:spLocks noGrp="1"/>
+          </p:cNvSpPr>
+          <p:nvPr>
+            <p:ph type="body" idx="1"/>
+          </p:nvPr>
+        </p:nvSpPr>
+        <p:spPr/>
+        <p:txBody>
+          <a:bodyPr/>
+          <a:lstStyle/>
+          <a:p>
+            <a:endParaRPr lang="en-US"/>
+          </a:p>
+        </p:txBody>
+      </p:sp>
+      <p:sp>
+        <p:nvSpPr>
+          <p:cNvPr id="4" name="Slide Number Placeholder 3"/>
+          <p:cNvSpPr>
+            <a:spLocks noGrp="1"/>
+          </p:cNvSpPr>
+          <p:nvPr>
+            <p:ph type="sldNum" sz="quarter" idx="10"/>
+          </p:nvPr>
+        </p:nvSpPr>
+        <p:spPr/>
+        <p:txBody>
+          <a:bodyPr/>
+          <a:lstStyle/>
+          <a:p>
+            <a:fld id="{90065BF4-54B7-ED4B-BAB6-0FA6251F32CC}" type="slidenum">
+              <a:rPr lang="en-US" smtClean="0"/>
+              <a:t>13</a:t>
+            </a:fld>
+            <a:endParaRPr lang="en-US"/>
+          </a:p>
+        </p:txBody>
+      </p:sp>
+    </p:spTree>
+    <p:extLst>
+      <p:ext uri="{BB962C8B-B14F-4D97-AF65-F5344CB8AC3E}">
+        <p14:creationId xmlns:p14="http://schemas.microsoft.com/office/powerpoint/2010/main" val="660170408"/>
+      </p:ext>
+    </p:extLst>
+  </p:cSld>
+  <p:clrMapOvr>
+    <a:masterClrMapping/>
+  </p:clrMapOvr>
+</p:notes>
+</file>
+
+<file path=ppt/notesSlides/notesSlide3.xml><?xml version="1.0" encoding="utf-8"?>
+<p:notes xmlns:a="http://schemas.openxmlformats.org/drawingml/2006/main" xmlns:r="http://schemas.openxmlformats.org/officeDocument/2006/relationships" xmlns:p="http://schemas.openxmlformats.org/presentationml/2006/main">
+  <p:cSld>
+    <p:spTree>
+      <p:nvGrpSpPr>
+        <p:cNvPr id="1" name=""/>
+        <p:cNvGrpSpPr/>
+        <p:nvPr/>
+      </p:nvGrpSpPr>
+      <p:grpSpPr>
+        <a:xfrm>
+          <a:off x="0" y="0"/>
+          <a:ext cx="0" cy="0"/>
+          <a:chOff x="0" y="0"/>
+          <a:chExt cx="0" cy="0"/>
+        </a:xfrm>
+      </p:grpSpPr>
+      <p:sp>
+        <p:nvSpPr>
+          <p:cNvPr id="2" name="Slide Image Placeholder 1"/>
+          <p:cNvSpPr>
+            <a:spLocks noGrp="1" noRot="1" noChangeAspect="1"/>
+          </p:cNvSpPr>
+          <p:nvPr>
+            <p:ph type="sldImg"/>
+          </p:nvPr>
+        </p:nvSpPr>
+        <p:spPr/>
+      </p:sp>
+      <p:sp>
+        <p:nvSpPr>
+          <p:cNvPr id="3" name="Notes Placeholder 2"/>
+          <p:cNvSpPr>
+            <a:spLocks noGrp="1"/>
+          </p:cNvSpPr>
+          <p:nvPr>
+            <p:ph type="body" idx="1"/>
+          </p:nvPr>
+        </p:nvSpPr>
+        <p:spPr/>
+        <p:txBody>
+          <a:bodyPr/>
+          <a:lstStyle/>
+          <a:p>
+            <a:endParaRPr lang="en-US" dirty="0"/>
+          </a:p>
+        </p:txBody>
+      </p:sp>
+      <p:sp>
+        <p:nvSpPr>
+          <p:cNvPr id="4" name="Slide Number Placeholder 3"/>
+          <p:cNvSpPr>
+            <a:spLocks noGrp="1"/>
+          </p:cNvSpPr>
+          <p:nvPr>
+            <p:ph type="sldNum" sz="quarter" idx="10"/>
+          </p:nvPr>
+        </p:nvSpPr>
+        <p:spPr/>
+        <p:txBody>
+          <a:bodyPr/>
+          <a:lstStyle/>
+          <a:p>
+            <a:fld id="{90065BF4-54B7-ED4B-BAB6-0FA6251F32CC}" type="slidenum">
+              <a:rPr lang="en-US" smtClean="0"/>
+              <a:t>14</a:t>
+            </a:fld>
+            <a:endParaRPr lang="en-US"/>
+          </a:p>
+        </p:txBody>
+      </p:sp>
+    </p:spTree>
+    <p:extLst>
+      <p:ext uri="{BB962C8B-B14F-4D97-AF65-F5344CB8AC3E}">
+        <p14:creationId xmlns:p14="http://schemas.microsoft.com/office/powerpoint/2010/main" val="1349001411"/>
+      </p:ext>
+    </p:extLst>
+  </p:cSld>
+  <p:clrMapOvr>
+    <a:masterClrMapping/>
+  </p:clrMapOvr>
+</p:notes>
+</file>
+
 <file path=ppt/slideLayouts/slideLayout1.xml><?xml version="1.0" encoding="utf-8"?>
 <p:sldLayout xmlns:a="http://schemas.openxmlformats.org/drawingml/2006/main" xmlns:r="http://schemas.openxmlformats.org/officeDocument/2006/relationships" xmlns:p="http://schemas.openxmlformats.org/presentationml/2006/main" type="title" preserve="1">
   <p:cSld name="Title Slide">
@@ -319,7 +924,7 @@
             <a:fld id="{B61BEF0D-F0BB-DE4B-95CE-6DB70DBA9567}" type="datetimeFigureOut">
               <a:rPr lang="en-US" smtClean="0"/>
               <a:pPr/>
-              <a:t>8/13/2017</a:t>
+              <a:t>8/13/17</a:t>
             </a:fld>
             <a:endParaRPr lang="en-US" dirty="0"/>
           </a:p>
@@ -596,7 +1201,7 @@
             <a:fld id="{B61BEF0D-F0BB-DE4B-95CE-6DB70DBA9567}" type="datetimeFigureOut">
               <a:rPr lang="en-US" smtClean="0"/>
               <a:pPr/>
-              <a:t>8/13/2017</a:t>
+              <a:t>8/13/17</a:t>
             </a:fld>
             <a:endParaRPr lang="en-US" dirty="0"/>
           </a:p>
@@ -792,7 +1397,7 @@
             <a:fld id="{B61BEF0D-F0BB-DE4B-95CE-6DB70DBA9567}" type="datetimeFigureOut">
               <a:rPr lang="en-US" smtClean="0"/>
               <a:pPr/>
-              <a:t>8/13/2017</a:t>
+              <a:t>8/13/17</a:t>
             </a:fld>
             <a:endParaRPr lang="en-US" dirty="0"/>
           </a:p>
@@ -1067,7 +1672,7 @@
             <a:fld id="{B61BEF0D-F0BB-DE4B-95CE-6DB70DBA9567}" type="datetimeFigureOut">
               <a:rPr lang="en-US" smtClean="0"/>
               <a:pPr/>
-              <a:t>8/13/2017</a:t>
+              <a:t>8/13/17</a:t>
             </a:fld>
             <a:endParaRPr lang="en-US" dirty="0"/>
           </a:p>
@@ -1410,7 +2015,7 @@
             <a:fld id="{B61BEF0D-F0BB-DE4B-95CE-6DB70DBA9567}" type="datetimeFigureOut">
               <a:rPr lang="en-US" smtClean="0"/>
               <a:pPr/>
-              <a:t>8/13/2017</a:t>
+              <a:t>8/13/17</a:t>
             </a:fld>
             <a:endParaRPr lang="en-US" dirty="0"/>
           </a:p>
@@ -2035,7 +2640,7 @@
             <a:fld id="{B61BEF0D-F0BB-DE4B-95CE-6DB70DBA9567}" type="datetimeFigureOut">
               <a:rPr lang="en-US" smtClean="0"/>
               <a:pPr/>
-              <a:t>8/13/2017</a:t>
+              <a:t>8/13/17</a:t>
             </a:fld>
             <a:endParaRPr lang="en-US" dirty="0"/>
           </a:p>
@@ -2897,7 +3502,7 @@
             <a:fld id="{B61BEF0D-F0BB-DE4B-95CE-6DB70DBA9567}" type="datetimeFigureOut">
               <a:rPr lang="en-US" smtClean="0"/>
               <a:pPr/>
-              <a:t>8/13/2017</a:t>
+              <a:t>8/13/17</a:t>
             </a:fld>
             <a:endParaRPr lang="en-US" dirty="0"/>
           </a:p>
@@ -3069,7 +3674,7 @@
             <a:fld id="{B61BEF0D-F0BB-DE4B-95CE-6DB70DBA9567}" type="datetimeFigureOut">
               <a:rPr lang="en-US" smtClean="0"/>
               <a:pPr/>
-              <a:t>8/13/2017</a:t>
+              <a:t>8/13/17</a:t>
             </a:fld>
             <a:endParaRPr lang="en-US" dirty="0"/>
           </a:p>
@@ -3251,7 +3856,7 @@
             <a:fld id="{B61BEF0D-F0BB-DE4B-95CE-6DB70DBA9567}" type="datetimeFigureOut">
               <a:rPr lang="en-US" smtClean="0"/>
               <a:pPr/>
-              <a:t>8/13/2017</a:t>
+              <a:t>8/13/17</a:t>
             </a:fld>
             <a:endParaRPr lang="en-US" dirty="0"/>
           </a:p>
@@ -3423,7 +4028,7 @@
             <a:fld id="{B61BEF0D-F0BB-DE4B-95CE-6DB70DBA9567}" type="datetimeFigureOut">
               <a:rPr lang="en-US" smtClean="0"/>
               <a:pPr/>
-              <a:t>8/13/2017</a:t>
+              <a:t>8/13/17</a:t>
             </a:fld>
             <a:endParaRPr lang="en-US" dirty="0"/>
           </a:p>
@@ -3672,7 +4277,7 @@
             <a:fld id="{B61BEF0D-F0BB-DE4B-95CE-6DB70DBA9567}" type="datetimeFigureOut">
               <a:rPr lang="en-US" smtClean="0"/>
               <a:pPr/>
-              <a:t>8/13/2017</a:t>
+              <a:t>8/13/17</a:t>
             </a:fld>
             <a:endParaRPr lang="en-US" dirty="0"/>
           </a:p>
@@ -3966,7 +4571,7 @@
             <a:fld id="{B61BEF0D-F0BB-DE4B-95CE-6DB70DBA9567}" type="datetimeFigureOut">
               <a:rPr lang="en-US" smtClean="0"/>
               <a:pPr/>
-              <a:t>8/13/2017</a:t>
+              <a:t>8/13/17</a:t>
             </a:fld>
             <a:endParaRPr lang="en-US" dirty="0"/>
           </a:p>
@@ -4412,7 +5017,7 @@
             <a:fld id="{B61BEF0D-F0BB-DE4B-95CE-6DB70DBA9567}" type="datetimeFigureOut">
               <a:rPr lang="en-US" smtClean="0"/>
               <a:pPr/>
-              <a:t>8/13/2017</a:t>
+              <a:t>8/13/17</a:t>
             </a:fld>
             <a:endParaRPr lang="en-US" dirty="0"/>
           </a:p>
@@ -4532,7 +5137,7 @@
             <a:fld id="{B61BEF0D-F0BB-DE4B-95CE-6DB70DBA9567}" type="datetimeFigureOut">
               <a:rPr lang="en-US" smtClean="0"/>
               <a:pPr/>
-              <a:t>8/13/2017</a:t>
+              <a:t>8/13/17</a:t>
             </a:fld>
             <a:endParaRPr lang="en-US" dirty="0"/>
           </a:p>
@@ -4629,7 +5234,7 @@
             <a:fld id="{B61BEF0D-F0BB-DE4B-95CE-6DB70DBA9567}" type="datetimeFigureOut">
               <a:rPr lang="en-US" smtClean="0"/>
               <a:pPr/>
-              <a:t>8/13/2017</a:t>
+              <a:t>8/13/17</a:t>
             </a:fld>
             <a:endParaRPr lang="en-US" dirty="0"/>
           </a:p>
@@ -4910,7 +5515,7 @@
             <a:fld id="{B61BEF0D-F0BB-DE4B-95CE-6DB70DBA9567}" type="datetimeFigureOut">
               <a:rPr lang="en-US" smtClean="0"/>
               <a:pPr/>
-              <a:t>8/13/2017</a:t>
+              <a:t>8/13/17</a:t>
             </a:fld>
             <a:endParaRPr lang="en-US" dirty="0"/>
           </a:p>
@@ -5187,7 +5792,7 @@
             <a:fld id="{B61BEF0D-F0BB-DE4B-95CE-6DB70DBA9567}" type="datetimeFigureOut">
               <a:rPr lang="en-US" smtClean="0"/>
               <a:pPr/>
-              <a:t>8/13/2017</a:t>
+              <a:t>8/13/17</a:t>
             </a:fld>
             <a:endParaRPr lang="en-US" dirty="0"/>
           </a:p>
@@ -5618,7 +6223,7 @@
             <a:fld id="{B61BEF0D-F0BB-DE4B-95CE-6DB70DBA9567}" type="datetimeFigureOut">
               <a:rPr lang="en-US" smtClean="0"/>
               <a:pPr/>
-              <a:t>8/13/2017</a:t>
+              <a:t>8/13/17</a:t>
             </a:fld>
             <a:endParaRPr lang="en-US" dirty="0"/>
           </a:p>
@@ -6322,7 +6927,7 @@
           <p:cNvPr id="3" name="TextBox 2">
             <a:extLst>
               <a:ext uri="{FF2B5EF4-FFF2-40B4-BE49-F238E27FC236}">
-                <a16:creationId xmlns:a16="http://schemas.microsoft.com/office/drawing/2014/main" id="{5FE08D2D-4F03-41CC-AD0D-5190FAF835C5}"/>
+                <a16:creationId xmlns:a16="http://schemas.microsoft.com/office/drawing/2014/main" xmlns="" id="{5FE08D2D-4F03-41CC-AD0D-5190FAF835C5}"/>
               </a:ext>
             </a:extLst>
           </p:cNvPr>
@@ -6403,7 +7008,7 @@
           <p:cNvPr id="5" name="Picture 4">
             <a:extLst>
               <a:ext uri="{FF2B5EF4-FFF2-40B4-BE49-F238E27FC236}">
-                <a16:creationId xmlns:a16="http://schemas.microsoft.com/office/drawing/2014/main" id="{48379F79-E9D9-40C7-AF77-9BACFD254E5B}"/>
+                <a16:creationId xmlns:a16="http://schemas.microsoft.com/office/drawing/2014/main" xmlns="" id="{48379F79-E9D9-40C7-AF77-9BACFD254E5B}"/>
               </a:ext>
             </a:extLst>
           </p:cNvPr>
@@ -6494,7 +7099,7 @@
           <p:cNvPr id="3" name="TextBox 2">
             <a:extLst>
               <a:ext uri="{FF2B5EF4-FFF2-40B4-BE49-F238E27FC236}">
-                <a16:creationId xmlns:a16="http://schemas.microsoft.com/office/drawing/2014/main" id="{5FE08D2D-4F03-41CC-AD0D-5190FAF835C5}"/>
+                <a16:creationId xmlns:a16="http://schemas.microsoft.com/office/drawing/2014/main" xmlns="" id="{5FE08D2D-4F03-41CC-AD0D-5190FAF835C5}"/>
               </a:ext>
             </a:extLst>
           </p:cNvPr>
@@ -6696,7 +7301,7 @@
           <p:cNvPr id="4" name="Table 3">
             <a:extLst>
               <a:ext uri="{FF2B5EF4-FFF2-40B4-BE49-F238E27FC236}">
-                <a16:creationId xmlns:a16="http://schemas.microsoft.com/office/drawing/2014/main" id="{8DCEED3E-FBD7-4193-95AD-7E84AD914061}"/>
+                <a16:creationId xmlns:a16="http://schemas.microsoft.com/office/drawing/2014/main" xmlns="" id="{8DCEED3E-FBD7-4193-95AD-7E84AD914061}"/>
               </a:ext>
             </a:extLst>
           </p:cNvPr>
@@ -6723,14 +7328,14 @@
                 <a:gridCol w="4938661">
                   <a:extLst>
                     <a:ext uri="{9D8B030D-6E8A-4147-A177-3AD203B41FA5}">
-                      <a16:colId xmlns:a16="http://schemas.microsoft.com/office/drawing/2014/main" val="1517334841"/>
+                      <a16:colId xmlns:a16="http://schemas.microsoft.com/office/drawing/2014/main" xmlns="" val="1517334841"/>
                     </a:ext>
                   </a:extLst>
                 </a:gridCol>
                 <a:gridCol w="3956982">
                   <a:extLst>
                     <a:ext uri="{9D8B030D-6E8A-4147-A177-3AD203B41FA5}">
-                      <a16:colId xmlns:a16="http://schemas.microsoft.com/office/drawing/2014/main" val="2434254746"/>
+                      <a16:colId xmlns:a16="http://schemas.microsoft.com/office/drawing/2014/main" xmlns="" val="2434254746"/>
                     </a:ext>
                   </a:extLst>
                 </a:gridCol>
@@ -6876,7 +7481,7 @@
                 </a:tc>
                 <a:extLst>
                   <a:ext uri="{0D108BD9-81ED-4DB2-BD59-A6C34878D82A}">
-                    <a16:rowId xmlns:a16="http://schemas.microsoft.com/office/drawing/2014/main" val="2735415994"/>
+                    <a16:rowId xmlns:a16="http://schemas.microsoft.com/office/drawing/2014/main" xmlns="" val="2735415994"/>
                   </a:ext>
                 </a:extLst>
               </a:tr>
@@ -7021,7 +7626,7 @@
                 </a:tc>
                 <a:extLst>
                   <a:ext uri="{0D108BD9-81ED-4DB2-BD59-A6C34878D82A}">
-                    <a16:rowId xmlns:a16="http://schemas.microsoft.com/office/drawing/2014/main" val="53378166"/>
+                    <a16:rowId xmlns:a16="http://schemas.microsoft.com/office/drawing/2014/main" xmlns="" val="53378166"/>
                   </a:ext>
                 </a:extLst>
               </a:tr>
@@ -7166,7 +7771,7 @@
                 </a:tc>
                 <a:extLst>
                   <a:ext uri="{0D108BD9-81ED-4DB2-BD59-A6C34878D82A}">
-                    <a16:rowId xmlns:a16="http://schemas.microsoft.com/office/drawing/2014/main" val="3499138134"/>
+                    <a16:rowId xmlns:a16="http://schemas.microsoft.com/office/drawing/2014/main" xmlns="" val="3499138134"/>
                   </a:ext>
                 </a:extLst>
               </a:tr>
@@ -7311,7 +7916,7 @@
                 </a:tc>
                 <a:extLst>
                   <a:ext uri="{0D108BD9-81ED-4DB2-BD59-A6C34878D82A}">
-                    <a16:rowId xmlns:a16="http://schemas.microsoft.com/office/drawing/2014/main" val="2029229186"/>
+                    <a16:rowId xmlns:a16="http://schemas.microsoft.com/office/drawing/2014/main" xmlns="" val="2029229186"/>
                   </a:ext>
                 </a:extLst>
               </a:tr>
@@ -7456,7 +8061,7 @@
                 </a:tc>
                 <a:extLst>
                   <a:ext uri="{0D108BD9-81ED-4DB2-BD59-A6C34878D82A}">
-                    <a16:rowId xmlns:a16="http://schemas.microsoft.com/office/drawing/2014/main" val="257496341"/>
+                    <a16:rowId xmlns:a16="http://schemas.microsoft.com/office/drawing/2014/main" xmlns="" val="257496341"/>
                   </a:ext>
                 </a:extLst>
               </a:tr>
@@ -7469,7 +8074,7 @@
           <p:cNvPr id="5" name="Table 4">
             <a:extLst>
               <a:ext uri="{FF2B5EF4-FFF2-40B4-BE49-F238E27FC236}">
-                <a16:creationId xmlns:a16="http://schemas.microsoft.com/office/drawing/2014/main" id="{7E3B2EB3-B496-434C-84A9-0C20B6D04055}"/>
+                <a16:creationId xmlns:a16="http://schemas.microsoft.com/office/drawing/2014/main" xmlns="" id="{7E3B2EB3-B496-434C-84A9-0C20B6D04055}"/>
               </a:ext>
             </a:extLst>
           </p:cNvPr>
@@ -7496,14 +8101,14 @@
                 <a:gridCol w="6204834">
                   <a:extLst>
                     <a:ext uri="{9D8B030D-6E8A-4147-A177-3AD203B41FA5}">
-                      <a16:colId xmlns:a16="http://schemas.microsoft.com/office/drawing/2014/main" val="1517334841"/>
+                      <a16:colId xmlns:a16="http://schemas.microsoft.com/office/drawing/2014/main" xmlns="" val="1517334841"/>
                     </a:ext>
                   </a:extLst>
                 </a:gridCol>
                 <a:gridCol w="2690809">
                   <a:extLst>
                     <a:ext uri="{9D8B030D-6E8A-4147-A177-3AD203B41FA5}">
-                      <a16:colId xmlns:a16="http://schemas.microsoft.com/office/drawing/2014/main" val="2434254746"/>
+                      <a16:colId xmlns:a16="http://schemas.microsoft.com/office/drawing/2014/main" xmlns="" val="2434254746"/>
                     </a:ext>
                   </a:extLst>
                 </a:gridCol>
@@ -7649,7 +8254,7 @@
                 </a:tc>
                 <a:extLst>
                   <a:ext uri="{0D108BD9-81ED-4DB2-BD59-A6C34878D82A}">
-                    <a16:rowId xmlns:a16="http://schemas.microsoft.com/office/drawing/2014/main" val="2735415994"/>
+                    <a16:rowId xmlns:a16="http://schemas.microsoft.com/office/drawing/2014/main" xmlns="" val="2735415994"/>
                   </a:ext>
                 </a:extLst>
               </a:tr>
@@ -7794,7 +8399,7 @@
                 </a:tc>
                 <a:extLst>
                   <a:ext uri="{0D108BD9-81ED-4DB2-BD59-A6C34878D82A}">
-                    <a16:rowId xmlns:a16="http://schemas.microsoft.com/office/drawing/2014/main" val="53378166"/>
+                    <a16:rowId xmlns:a16="http://schemas.microsoft.com/office/drawing/2014/main" xmlns="" val="53378166"/>
                   </a:ext>
                 </a:extLst>
               </a:tr>
@@ -7939,7 +8544,7 @@
                 </a:tc>
                 <a:extLst>
                   <a:ext uri="{0D108BD9-81ED-4DB2-BD59-A6C34878D82A}">
-                    <a16:rowId xmlns:a16="http://schemas.microsoft.com/office/drawing/2014/main" val="3499138134"/>
+                    <a16:rowId xmlns:a16="http://schemas.microsoft.com/office/drawing/2014/main" xmlns="" val="3499138134"/>
                   </a:ext>
                 </a:extLst>
               </a:tr>
@@ -8084,7 +8689,7 @@
                 </a:tc>
                 <a:extLst>
                   <a:ext uri="{0D108BD9-81ED-4DB2-BD59-A6C34878D82A}">
-                    <a16:rowId xmlns:a16="http://schemas.microsoft.com/office/drawing/2014/main" val="2029229186"/>
+                    <a16:rowId xmlns:a16="http://schemas.microsoft.com/office/drawing/2014/main" xmlns="" val="2029229186"/>
                   </a:ext>
                 </a:extLst>
               </a:tr>
@@ -8229,7 +8834,7 @@
                 </a:tc>
                 <a:extLst>
                   <a:ext uri="{0D108BD9-81ED-4DB2-BD59-A6C34878D82A}">
-                    <a16:rowId xmlns:a16="http://schemas.microsoft.com/office/drawing/2014/main" val="257496341"/>
+                    <a16:rowId xmlns:a16="http://schemas.microsoft.com/office/drawing/2014/main" xmlns="" val="257496341"/>
                   </a:ext>
                 </a:extLst>
               </a:tr>
@@ -8242,7 +8847,7 @@
           <p:cNvPr id="6" name="TextBox 5">
             <a:extLst>
               <a:ext uri="{FF2B5EF4-FFF2-40B4-BE49-F238E27FC236}">
-                <a16:creationId xmlns:a16="http://schemas.microsoft.com/office/drawing/2014/main" id="{9735059D-8639-472D-85DD-B005F42962B3}"/>
+                <a16:creationId xmlns:a16="http://schemas.microsoft.com/office/drawing/2014/main" xmlns="" id="{9735059D-8639-472D-85DD-B005F42962B3}"/>
               </a:ext>
             </a:extLst>
           </p:cNvPr>
@@ -8277,7 +8882,7 @@
           <p:cNvPr id="7" name="TextBox 6">
             <a:extLst>
               <a:ext uri="{FF2B5EF4-FFF2-40B4-BE49-F238E27FC236}">
-                <a16:creationId xmlns:a16="http://schemas.microsoft.com/office/drawing/2014/main" id="{C29E70AB-A2EE-4DE5-B615-25930E83BB39}"/>
+                <a16:creationId xmlns:a16="http://schemas.microsoft.com/office/drawing/2014/main" xmlns="" id="{C29E70AB-A2EE-4DE5-B615-25930E83BB39}"/>
               </a:ext>
             </a:extLst>
           </p:cNvPr>
@@ -8369,7 +8974,7 @@
           <p:cNvPr id="3" name="TextBox 2">
             <a:extLst>
               <a:ext uri="{FF2B5EF4-FFF2-40B4-BE49-F238E27FC236}">
-                <a16:creationId xmlns:a16="http://schemas.microsoft.com/office/drawing/2014/main" id="{5FE08D2D-4F03-41CC-AD0D-5190FAF835C5}"/>
+                <a16:creationId xmlns:a16="http://schemas.microsoft.com/office/drawing/2014/main" xmlns="" id="{5FE08D2D-4F03-41CC-AD0D-5190FAF835C5}"/>
               </a:ext>
             </a:extLst>
           </p:cNvPr>
@@ -8496,7 +9101,7 @@
           <p:cNvPr id="4" name="Table 3">
             <a:extLst>
               <a:ext uri="{FF2B5EF4-FFF2-40B4-BE49-F238E27FC236}">
-                <a16:creationId xmlns:a16="http://schemas.microsoft.com/office/drawing/2014/main" id="{F30C9338-C546-49B6-A915-13CBDF47517F}"/>
+                <a16:creationId xmlns:a16="http://schemas.microsoft.com/office/drawing/2014/main" xmlns="" id="{F30C9338-C546-49B6-A915-13CBDF47517F}"/>
               </a:ext>
             </a:extLst>
           </p:cNvPr>
@@ -8525,28 +9130,28 @@
                 <a:gridCol w="1183904">
                   <a:extLst>
                     <a:ext uri="{9D8B030D-6E8A-4147-A177-3AD203B41FA5}">
-                      <a16:colId xmlns:a16="http://schemas.microsoft.com/office/drawing/2014/main" val="3414294309"/>
+                      <a16:colId xmlns:a16="http://schemas.microsoft.com/office/drawing/2014/main" xmlns="" val="3414294309"/>
                     </a:ext>
                   </a:extLst>
                 </a:gridCol>
                 <a:gridCol w="1241778">
                   <a:extLst>
                     <a:ext uri="{9D8B030D-6E8A-4147-A177-3AD203B41FA5}">
-                      <a16:colId xmlns:a16="http://schemas.microsoft.com/office/drawing/2014/main" val="3203402679"/>
+                      <a16:colId xmlns:a16="http://schemas.microsoft.com/office/drawing/2014/main" xmlns="" val="3203402679"/>
                     </a:ext>
                   </a:extLst>
                 </a:gridCol>
                 <a:gridCol w="948266">
                   <a:extLst>
                     <a:ext uri="{9D8B030D-6E8A-4147-A177-3AD203B41FA5}">
-                      <a16:colId xmlns:a16="http://schemas.microsoft.com/office/drawing/2014/main" val="3772256673"/>
+                      <a16:colId xmlns:a16="http://schemas.microsoft.com/office/drawing/2014/main" xmlns="" val="3772256673"/>
                     </a:ext>
                   </a:extLst>
                 </a:gridCol>
                 <a:gridCol w="1693335">
                   <a:extLst>
                     <a:ext uri="{9D8B030D-6E8A-4147-A177-3AD203B41FA5}">
-                      <a16:colId xmlns:a16="http://schemas.microsoft.com/office/drawing/2014/main" val="1549248394"/>
+                      <a16:colId xmlns:a16="http://schemas.microsoft.com/office/drawing/2014/main" xmlns="" val="1549248394"/>
                     </a:ext>
                   </a:extLst>
                 </a:gridCol>
@@ -8670,7 +9275,7 @@
                 </a:tc>
                 <a:extLst>
                   <a:ext uri="{0D108BD9-81ED-4DB2-BD59-A6C34878D82A}">
-                    <a16:rowId xmlns:a16="http://schemas.microsoft.com/office/drawing/2014/main" val="441241208"/>
+                    <a16:rowId xmlns:a16="http://schemas.microsoft.com/office/drawing/2014/main" xmlns="" val="441241208"/>
                   </a:ext>
                 </a:extLst>
               </a:tr>
@@ -8793,7 +9398,7 @@
                 </a:tc>
                 <a:extLst>
                   <a:ext uri="{0D108BD9-81ED-4DB2-BD59-A6C34878D82A}">
-                    <a16:rowId xmlns:a16="http://schemas.microsoft.com/office/drawing/2014/main" val="2520659642"/>
+                    <a16:rowId xmlns:a16="http://schemas.microsoft.com/office/drawing/2014/main" xmlns="" val="2520659642"/>
                   </a:ext>
                 </a:extLst>
               </a:tr>
@@ -8916,7 +9521,7 @@
                 </a:tc>
                 <a:extLst>
                   <a:ext uri="{0D108BD9-81ED-4DB2-BD59-A6C34878D82A}">
-                    <a16:rowId xmlns:a16="http://schemas.microsoft.com/office/drawing/2014/main" val="3995171463"/>
+                    <a16:rowId xmlns:a16="http://schemas.microsoft.com/office/drawing/2014/main" xmlns="" val="3995171463"/>
                   </a:ext>
                 </a:extLst>
               </a:tr>
@@ -9039,7 +9644,7 @@
                 </a:tc>
                 <a:extLst>
                   <a:ext uri="{0D108BD9-81ED-4DB2-BD59-A6C34878D82A}">
-                    <a16:rowId xmlns:a16="http://schemas.microsoft.com/office/drawing/2014/main" val="803761382"/>
+                    <a16:rowId xmlns:a16="http://schemas.microsoft.com/office/drawing/2014/main" xmlns="" val="803761382"/>
                   </a:ext>
                 </a:extLst>
               </a:tr>
@@ -9052,7 +9657,7 @@
           <p:cNvPr id="6" name="TextBox 5">
             <a:extLst>
               <a:ext uri="{FF2B5EF4-FFF2-40B4-BE49-F238E27FC236}">
-                <a16:creationId xmlns:a16="http://schemas.microsoft.com/office/drawing/2014/main" id="{4D9B7089-544A-458E-9FAD-F71AF7792DD9}"/>
+                <a16:creationId xmlns:a16="http://schemas.microsoft.com/office/drawing/2014/main" xmlns="" id="{4D9B7089-544A-458E-9FAD-F71AF7792DD9}"/>
               </a:ext>
             </a:extLst>
           </p:cNvPr>
@@ -9148,7 +9753,7 @@
           <p:cNvPr id="7" name="Picture 6">
             <a:extLst>
               <a:ext uri="{FF2B5EF4-FFF2-40B4-BE49-F238E27FC236}">
-                <a16:creationId xmlns:a16="http://schemas.microsoft.com/office/drawing/2014/main" id="{5ED4A67D-E6ED-498D-AA01-88C92C450CAA}"/>
+                <a16:creationId xmlns:a16="http://schemas.microsoft.com/office/drawing/2014/main" xmlns="" id="{5ED4A67D-E6ED-498D-AA01-88C92C450CAA}"/>
               </a:ext>
             </a:extLst>
           </p:cNvPr>
@@ -9156,7 +9761,7 @@
           <p:nvPr/>
         </p:nvPicPr>
         <p:blipFill>
-          <a:blip r:embed="rId2">
+          <a:blip r:embed="rId3">
             <a:extLst>
               <a:ext uri="{28A0092B-C50C-407E-A947-70E740481C1C}">
                 <a14:useLocalDpi xmlns:a14="http://schemas.microsoft.com/office/drawing/2010/main" val="0"/>
@@ -9244,7 +9849,7 @@
           <p:cNvPr id="3" name="TextBox 2">
             <a:extLst>
               <a:ext uri="{FF2B5EF4-FFF2-40B4-BE49-F238E27FC236}">
-                <a16:creationId xmlns:a16="http://schemas.microsoft.com/office/drawing/2014/main" id="{5FE08D2D-4F03-41CC-AD0D-5190FAF835C5}"/>
+                <a16:creationId xmlns:a16="http://schemas.microsoft.com/office/drawing/2014/main" xmlns="" id="{5FE08D2D-4F03-41CC-AD0D-5190FAF835C5}"/>
               </a:ext>
             </a:extLst>
           </p:cNvPr>
@@ -9285,7 +9890,7 @@
           <p:cNvPr id="6" name="Graphic 5" descr="Sheep">
             <a:extLst>
               <a:ext uri="{FF2B5EF4-FFF2-40B4-BE49-F238E27FC236}">
-                <a16:creationId xmlns:a16="http://schemas.microsoft.com/office/drawing/2014/main" id="{8C2A2B99-5BFF-42A4-AE16-6909CA0E1B3C}"/>
+                <a16:creationId xmlns:a16="http://schemas.microsoft.com/office/drawing/2014/main" xmlns="" id="{8C2A2B99-5BFF-42A4-AE16-6909CA0E1B3C}"/>
               </a:ext>
             </a:extLst>
           </p:cNvPr>
@@ -9298,7 +9903,7 @@
           <a:blip r:embed="rId2">
             <a:extLst>
               <a:ext uri="{96DAC541-7B7A-43D3-8B79-37D633B846F1}">
-                <asvg:svgBlip xmlns:asvg="http://schemas.microsoft.com/office/drawing/2016/SVG/main" r:embed="rId3"/>
+                <asvg:svgBlip xmlns:asvg="http://schemas.microsoft.com/office/drawing/2016/SVG/main" xmlns="" r:embed="rId3"/>
               </a:ext>
             </a:extLst>
           </a:blip>
@@ -9321,7 +9926,7 @@
           <p:cNvPr id="8" name="Graphic 7" descr="Pig">
             <a:extLst>
               <a:ext uri="{FF2B5EF4-FFF2-40B4-BE49-F238E27FC236}">
-                <a16:creationId xmlns:a16="http://schemas.microsoft.com/office/drawing/2014/main" id="{1B35EB13-2CFD-45DA-9E8E-35385989DF92}"/>
+                <a16:creationId xmlns:a16="http://schemas.microsoft.com/office/drawing/2014/main" xmlns="" id="{1B35EB13-2CFD-45DA-9E8E-35385989DF92}"/>
               </a:ext>
             </a:extLst>
           </p:cNvPr>
@@ -9334,7 +9939,7 @@
           <a:blip r:embed="rId4">
             <a:extLst>
               <a:ext uri="{96DAC541-7B7A-43D3-8B79-37D633B846F1}">
-                <asvg:svgBlip xmlns:asvg="http://schemas.microsoft.com/office/drawing/2016/SVG/main" r:embed="rId5"/>
+                <asvg:svgBlip xmlns:asvg="http://schemas.microsoft.com/office/drawing/2016/SVG/main" xmlns="" r:embed="rId5"/>
               </a:ext>
             </a:extLst>
           </a:blip>
@@ -9357,7 +9962,7 @@
           <p:cNvPr id="10" name="Graphic 9" descr="Rooster">
             <a:extLst>
               <a:ext uri="{FF2B5EF4-FFF2-40B4-BE49-F238E27FC236}">
-                <a16:creationId xmlns:a16="http://schemas.microsoft.com/office/drawing/2014/main" id="{659C2573-33AE-4705-B628-40B416D6B1EB}"/>
+                <a16:creationId xmlns:a16="http://schemas.microsoft.com/office/drawing/2014/main" xmlns="" id="{659C2573-33AE-4705-B628-40B416D6B1EB}"/>
               </a:ext>
             </a:extLst>
           </p:cNvPr>
@@ -9370,7 +9975,7 @@
           <a:blip r:embed="rId6">
             <a:extLst>
               <a:ext uri="{96DAC541-7B7A-43D3-8B79-37D633B846F1}">
-                <asvg:svgBlip xmlns:asvg="http://schemas.microsoft.com/office/drawing/2016/SVG/main" r:embed="rId7"/>
+                <asvg:svgBlip xmlns:asvg="http://schemas.microsoft.com/office/drawing/2016/SVG/main" xmlns="" r:embed="rId7"/>
               </a:ext>
             </a:extLst>
           </a:blip>
@@ -9393,7 +9998,7 @@
           <p:cNvPr id="12" name="Graphic 11" descr="Cow">
             <a:extLst>
               <a:ext uri="{FF2B5EF4-FFF2-40B4-BE49-F238E27FC236}">
-                <a16:creationId xmlns:a16="http://schemas.microsoft.com/office/drawing/2014/main" id="{1E2A4920-4622-4729-9876-2C97CE9A8D6A}"/>
+                <a16:creationId xmlns:a16="http://schemas.microsoft.com/office/drawing/2014/main" xmlns="" id="{1E2A4920-4622-4729-9876-2C97CE9A8D6A}"/>
               </a:ext>
             </a:extLst>
           </p:cNvPr>
@@ -9406,7 +10011,7 @@
           <a:blip r:embed="rId8">
             <a:extLst>
               <a:ext uri="{96DAC541-7B7A-43D3-8B79-37D633B846F1}">
-                <asvg:svgBlip xmlns:asvg="http://schemas.microsoft.com/office/drawing/2016/SVG/main" r:embed="rId9"/>
+                <asvg:svgBlip xmlns:asvg="http://schemas.microsoft.com/office/drawing/2016/SVG/main" xmlns="" r:embed="rId9"/>
               </a:ext>
             </a:extLst>
           </a:blip>
@@ -9429,7 +10034,7 @@
           <p:cNvPr id="14" name="Graphic 13" descr="Goat">
             <a:extLst>
               <a:ext uri="{FF2B5EF4-FFF2-40B4-BE49-F238E27FC236}">
-                <a16:creationId xmlns:a16="http://schemas.microsoft.com/office/drawing/2014/main" id="{6CC7B603-B920-4301-BC48-68FB832F44C5}"/>
+                <a16:creationId xmlns:a16="http://schemas.microsoft.com/office/drawing/2014/main" xmlns="" id="{6CC7B603-B920-4301-BC48-68FB832F44C5}"/>
               </a:ext>
             </a:extLst>
           </p:cNvPr>
@@ -9442,7 +10047,7 @@
           <a:blip r:embed="rId10">
             <a:extLst>
               <a:ext uri="{96DAC541-7B7A-43D3-8B79-37D633B846F1}">
-                <asvg:svgBlip xmlns:asvg="http://schemas.microsoft.com/office/drawing/2016/SVG/main" r:embed="rId11"/>
+                <asvg:svgBlip xmlns:asvg="http://schemas.microsoft.com/office/drawing/2016/SVG/main" xmlns="" r:embed="rId11"/>
               </a:ext>
             </a:extLst>
           </a:blip>
@@ -9465,7 +10070,7 @@
           <p:cNvPr id="16" name="Graphic 15" descr="Horse">
             <a:extLst>
               <a:ext uri="{FF2B5EF4-FFF2-40B4-BE49-F238E27FC236}">
-                <a16:creationId xmlns:a16="http://schemas.microsoft.com/office/drawing/2014/main" id="{CBCBFAEF-52FF-4676-B477-E265CD792BD9}"/>
+                <a16:creationId xmlns:a16="http://schemas.microsoft.com/office/drawing/2014/main" xmlns="" id="{CBCBFAEF-52FF-4676-B477-E265CD792BD9}"/>
               </a:ext>
             </a:extLst>
           </p:cNvPr>
@@ -9478,7 +10083,7 @@
           <a:blip r:embed="rId12">
             <a:extLst>
               <a:ext uri="{96DAC541-7B7A-43D3-8B79-37D633B846F1}">
-                <asvg:svgBlip xmlns:asvg="http://schemas.microsoft.com/office/drawing/2016/SVG/main" r:embed="rId13"/>
+                <asvg:svgBlip xmlns:asvg="http://schemas.microsoft.com/office/drawing/2016/SVG/main" xmlns="" r:embed="rId13"/>
               </a:ext>
             </a:extLst>
           </a:blip>
@@ -9501,7 +10106,7 @@
           <p:cNvPr id="18" name="Graphic 17" descr="Barn">
             <a:extLst>
               <a:ext uri="{FF2B5EF4-FFF2-40B4-BE49-F238E27FC236}">
-                <a16:creationId xmlns:a16="http://schemas.microsoft.com/office/drawing/2014/main" id="{E9CC7A8E-AE81-4A85-8C9F-142E81F8885C}"/>
+                <a16:creationId xmlns:a16="http://schemas.microsoft.com/office/drawing/2014/main" xmlns="" id="{E9CC7A8E-AE81-4A85-8C9F-142E81F8885C}"/>
               </a:ext>
             </a:extLst>
           </p:cNvPr>
@@ -9514,7 +10119,7 @@
           <a:blip r:embed="rId14">
             <a:extLst>
               <a:ext uri="{96DAC541-7B7A-43D3-8B79-37D633B846F1}">
-                <asvg:svgBlip xmlns:asvg="http://schemas.microsoft.com/office/drawing/2016/SVG/main" r:embed="rId15"/>
+                <asvg:svgBlip xmlns:asvg="http://schemas.microsoft.com/office/drawing/2016/SVG/main" xmlns="" r:embed="rId15"/>
               </a:ext>
             </a:extLst>
           </a:blip>
@@ -9537,7 +10142,7 @@
           <p:cNvPr id="20" name="Graphic 19" descr="Silo">
             <a:extLst>
               <a:ext uri="{FF2B5EF4-FFF2-40B4-BE49-F238E27FC236}">
-                <a16:creationId xmlns:a16="http://schemas.microsoft.com/office/drawing/2014/main" id="{9453F8FA-1457-45A2-9034-89956C212C25}"/>
+                <a16:creationId xmlns:a16="http://schemas.microsoft.com/office/drawing/2014/main" xmlns="" id="{9453F8FA-1457-45A2-9034-89956C212C25}"/>
               </a:ext>
             </a:extLst>
           </p:cNvPr>
@@ -9550,7 +10155,7 @@
           <a:blip r:embed="rId16">
             <a:extLst>
               <a:ext uri="{96DAC541-7B7A-43D3-8B79-37D633B846F1}">
-                <asvg:svgBlip xmlns:asvg="http://schemas.microsoft.com/office/drawing/2016/SVG/main" r:embed="rId17"/>
+                <asvg:svgBlip xmlns:asvg="http://schemas.microsoft.com/office/drawing/2016/SVG/main" xmlns="" r:embed="rId17"/>
               </a:ext>
             </a:extLst>
           </a:blip>
@@ -9630,7 +10235,7 @@
           <p:cNvPr id="3" name="TextBox 2">
             <a:extLst>
               <a:ext uri="{FF2B5EF4-FFF2-40B4-BE49-F238E27FC236}">
-                <a16:creationId xmlns:a16="http://schemas.microsoft.com/office/drawing/2014/main" id="{5FE08D2D-4F03-41CC-AD0D-5190FAF835C5}"/>
+                <a16:creationId xmlns:a16="http://schemas.microsoft.com/office/drawing/2014/main" xmlns="" id="{5FE08D2D-4F03-41CC-AD0D-5190FAF835C5}"/>
               </a:ext>
             </a:extLst>
           </p:cNvPr>
@@ -9956,7 +10561,7 @@
           <p:cNvPr id="2" name="Title 1">
             <a:extLst>
               <a:ext uri="{FF2B5EF4-FFF2-40B4-BE49-F238E27FC236}">
-                <a16:creationId xmlns:a16="http://schemas.microsoft.com/office/drawing/2014/main" id="{26822B25-6E46-4AEF-929A-5ADCB6FBC7A7}"/>
+                <a16:creationId xmlns:a16="http://schemas.microsoft.com/office/drawing/2014/main" xmlns="" id="{26822B25-6E46-4AEF-929A-5ADCB6FBC7A7}"/>
               </a:ext>
             </a:extLst>
           </p:cNvPr>
@@ -9989,7 +10594,7 @@
           <p:cNvPr id="3" name="Content Placeholder 2">
             <a:extLst>
               <a:ext uri="{FF2B5EF4-FFF2-40B4-BE49-F238E27FC236}">
-                <a16:creationId xmlns:a16="http://schemas.microsoft.com/office/drawing/2014/main" id="{89274F08-7D4E-45B1-9D36-7117C50B3C3A}"/>
+                <a16:creationId xmlns:a16="http://schemas.microsoft.com/office/drawing/2014/main" xmlns="" id="{89274F08-7D4E-45B1-9D36-7117C50B3C3A}"/>
               </a:ext>
             </a:extLst>
           </p:cNvPr>
@@ -10044,12 +10649,49 @@
               <a:buNone/>
             </a:pPr>
             <a:r>
+              <a:rPr lang="en-US" sz="2400" b="1" dirty="0" smtClean="0"/>
+              <a:t>Prices-split </a:t>
+            </a:r>
+            <a:r>
+              <a:rPr lang="en-US" sz="2400" dirty="0" smtClean="0"/>
+              <a:t>- </a:t>
+            </a:r>
+            <a:r>
+              <a:rPr lang="en-US" sz="2400" dirty="0" err="1" smtClean="0"/>
+              <a:t>adjusted.csv</a:t>
+            </a:r>
+            <a:r>
+              <a:rPr lang="en-US" sz="2400" dirty="0" smtClean="0"/>
+              <a:t> </a:t>
+            </a:r>
+            <a:r>
+              <a:rPr lang="en-US" sz="2400" dirty="0"/>
+              <a:t>– adjustment for and stock splits  51.4MB</a:t>
+            </a:r>
+          </a:p>
+          <a:p>
+            <a:pPr marL="0" indent="0">
+              <a:buNone/>
+            </a:pPr>
+            <a:r>
+              <a:rPr lang="en-US" sz="2400" b="1" dirty="0" err="1"/>
+              <a:t>Securities.csv</a:t>
+            </a:r>
+            <a:r>
               <a:rPr lang="en-US" sz="2400" b="1" dirty="0"/>
-              <a:t>Prices-split</a:t>
+              <a:t> </a:t>
             </a:r>
             <a:r>
               <a:rPr lang="en-US" sz="2400" dirty="0"/>
-              <a:t>-adjusted.csv – adjustment for and stock splits  51.4MB</a:t>
+              <a:t>-</a:t>
+            </a:r>
+            <a:r>
+              <a:rPr lang="en-US" sz="2400" dirty="0" smtClean="0"/>
+              <a:t> </a:t>
+            </a:r>
+            <a:r>
+              <a:rPr lang="en-US" sz="2400" dirty="0"/>
+              <a:t>descriptions of the companies and different sectors  60KB</a:t>
             </a:r>
           </a:p>
           <a:p>
@@ -10057,12 +10699,24 @@
               <a:buNone/>
             </a:pPr>
             <a:r>
+              <a:rPr lang="en-US" sz="2400" b="1" dirty="0" err="1"/>
+              <a:t>Fundamentals.csv</a:t>
+            </a:r>
+            <a:r>
               <a:rPr lang="en-US" sz="2400" b="1" dirty="0"/>
-              <a:t>Securities.csv </a:t>
+              <a:t> </a:t>
             </a:r>
             <a:r>
               <a:rPr lang="en-US" sz="2400" dirty="0"/>
-              <a:t>– descriptions of the companies and different sectors  60KB</a:t>
+              <a:t>-</a:t>
+            </a:r>
+            <a:r>
+              <a:rPr lang="en-US" sz="2400" dirty="0" smtClean="0"/>
+              <a:t> </a:t>
+            </a:r>
+            <a:r>
+              <a:rPr lang="en-US" sz="2400" dirty="0"/>
+              <a:t>SEC 10K filings for each company  1.3MB</a:t>
             </a:r>
           </a:p>
           <a:p>
@@ -10070,27 +10724,9 @@
               <a:buNone/>
             </a:pPr>
             <a:r>
-              <a:rPr lang="en-US" sz="2400" b="1" dirty="0"/>
-              <a:t>Fundamentals.csv </a:t>
-            </a:r>
-            <a:r>
               <a:rPr lang="en-US" sz="2400" dirty="0"/>
-              <a:t>– SEC 10K filings for each company  1.3MB</a:t>
-            </a:r>
-          </a:p>
-          <a:p>
-            <a:pPr marL="0" indent="0">
-              <a:buNone/>
-            </a:pPr>
-            <a:r>
-              <a:rPr lang="en-US" sz="2400" dirty="0"/>
-              <a:t>Total </a:t>
-            </a:r>
-            <a:r>
-              <a:rPr lang="en-US" sz="2400"/>
-              <a:t>Data size is 103.6MB</a:t>
-            </a:r>
-            <a:endParaRPr lang="en-US" sz="2400" dirty="0"/>
+              <a:t>Total Data size is 103.6MB</a:t>
+            </a:r>
           </a:p>
           <a:p>
             <a:pPr marL="0" indent="0">
@@ -10144,7 +10780,7 @@
           <p:cNvPr id="2" name="Title 1">
             <a:extLst>
               <a:ext uri="{FF2B5EF4-FFF2-40B4-BE49-F238E27FC236}">
-                <a16:creationId xmlns:a16="http://schemas.microsoft.com/office/drawing/2014/main" id="{26822B25-6E46-4AEF-929A-5ADCB6FBC7A7}"/>
+                <a16:creationId xmlns:a16="http://schemas.microsoft.com/office/drawing/2014/main" xmlns="" id="{26822B25-6E46-4AEF-929A-5ADCB6FBC7A7}"/>
               </a:ext>
             </a:extLst>
           </p:cNvPr>
@@ -10177,7 +10813,7 @@
           <p:cNvPr id="3" name="Content Placeholder 2">
             <a:extLst>
               <a:ext uri="{FF2B5EF4-FFF2-40B4-BE49-F238E27FC236}">
-                <a16:creationId xmlns:a16="http://schemas.microsoft.com/office/drawing/2014/main" id="{89274F08-7D4E-45B1-9D36-7117C50B3C3A}"/>
+                <a16:creationId xmlns:a16="http://schemas.microsoft.com/office/drawing/2014/main" xmlns="" id="{89274F08-7D4E-45B1-9D36-7117C50B3C3A}"/>
               </a:ext>
             </a:extLst>
           </p:cNvPr>
@@ -10250,7 +10886,7 @@
           <p:cNvPr id="5" name="Picture 4">
             <a:extLst>
               <a:ext uri="{FF2B5EF4-FFF2-40B4-BE49-F238E27FC236}">
-                <a16:creationId xmlns:a16="http://schemas.microsoft.com/office/drawing/2014/main" id="{C558E54D-880A-4D13-A5FA-7CD4C9E451BA}"/>
+                <a16:creationId xmlns:a16="http://schemas.microsoft.com/office/drawing/2014/main" xmlns="" id="{C558E54D-880A-4D13-A5FA-7CD4C9E451BA}"/>
               </a:ext>
             </a:extLst>
           </p:cNvPr>
@@ -10309,7 +10945,7 @@
           <p:cNvPr id="2" name="Title 1">
             <a:extLst>
               <a:ext uri="{FF2B5EF4-FFF2-40B4-BE49-F238E27FC236}">
-                <a16:creationId xmlns:a16="http://schemas.microsoft.com/office/drawing/2014/main" id="{26822B25-6E46-4AEF-929A-5ADCB6FBC7A7}"/>
+                <a16:creationId xmlns:a16="http://schemas.microsoft.com/office/drawing/2014/main" xmlns="" id="{26822B25-6E46-4AEF-929A-5ADCB6FBC7A7}"/>
               </a:ext>
             </a:extLst>
           </p:cNvPr>
@@ -10342,7 +10978,7 @@
           <p:cNvPr id="3" name="Content Placeholder 2">
             <a:extLst>
               <a:ext uri="{FF2B5EF4-FFF2-40B4-BE49-F238E27FC236}">
-                <a16:creationId xmlns:a16="http://schemas.microsoft.com/office/drawing/2014/main" id="{89274F08-7D4E-45B1-9D36-7117C50B3C3A}"/>
+                <a16:creationId xmlns:a16="http://schemas.microsoft.com/office/drawing/2014/main" xmlns="" id="{89274F08-7D4E-45B1-9D36-7117C50B3C3A}"/>
               </a:ext>
             </a:extLst>
           </p:cNvPr>
@@ -10405,7 +11041,15 @@
             </a:pPr>
             <a:r>
               <a:rPr lang="en-US" sz="2400" dirty="0"/>
-              <a:t>The headings for fundamentals is ID, Ticker Symbol, Period Ending, Accounts Payable, </a:t>
+              <a:t>The headings for </a:t>
+            </a:r>
+            <a:r>
+              <a:rPr lang="en-US" sz="2400" dirty="0" smtClean="0"/>
+              <a:t>fundamentals: ID</a:t>
+            </a:r>
+            <a:r>
+              <a:rPr lang="en-US" sz="2400" dirty="0"/>
+              <a:t>, Ticker Symbol, Period Ending, Accounts Payable, </a:t>
             </a:r>
             <a:r>
               <a:rPr lang="en-US" sz="2400" dirty="0" err="1"/>
@@ -10534,7 +11178,7 @@
           <p:cNvPr id="3" name="TextBox 2">
             <a:extLst>
               <a:ext uri="{FF2B5EF4-FFF2-40B4-BE49-F238E27FC236}">
-                <a16:creationId xmlns:a16="http://schemas.microsoft.com/office/drawing/2014/main" id="{5FE08D2D-4F03-41CC-AD0D-5190FAF835C5}"/>
+                <a16:creationId xmlns:a16="http://schemas.microsoft.com/office/drawing/2014/main" xmlns="" id="{5FE08D2D-4F03-41CC-AD0D-5190FAF835C5}"/>
               </a:ext>
             </a:extLst>
           </p:cNvPr>
@@ -10635,7 +11279,7 @@
           <p:cNvPr id="3" name="TextBox 2">
             <a:extLst>
               <a:ext uri="{FF2B5EF4-FFF2-40B4-BE49-F238E27FC236}">
-                <a16:creationId xmlns:a16="http://schemas.microsoft.com/office/drawing/2014/main" id="{5FE08D2D-4F03-41CC-AD0D-5190FAF835C5}"/>
+                <a16:creationId xmlns:a16="http://schemas.microsoft.com/office/drawing/2014/main" xmlns="" id="{5FE08D2D-4F03-41CC-AD0D-5190FAF835C5}"/>
               </a:ext>
             </a:extLst>
           </p:cNvPr>
@@ -10836,7 +11480,7 @@
           <p:cNvPr id="3" name="TextBox 2">
             <a:extLst>
               <a:ext uri="{FF2B5EF4-FFF2-40B4-BE49-F238E27FC236}">
-                <a16:creationId xmlns:a16="http://schemas.microsoft.com/office/drawing/2014/main" id="{5FE08D2D-4F03-41CC-AD0D-5190FAF835C5}"/>
+                <a16:creationId xmlns:a16="http://schemas.microsoft.com/office/drawing/2014/main" xmlns="" id="{5FE08D2D-4F03-41CC-AD0D-5190FAF835C5}"/>
               </a:ext>
             </a:extLst>
           </p:cNvPr>
@@ -11025,7 +11669,7 @@
           <p:cNvPr id="3" name="TextBox 2">
             <a:extLst>
               <a:ext uri="{FF2B5EF4-FFF2-40B4-BE49-F238E27FC236}">
-                <a16:creationId xmlns:a16="http://schemas.microsoft.com/office/drawing/2014/main" id="{5FE08D2D-4F03-41CC-AD0D-5190FAF835C5}"/>
+                <a16:creationId xmlns:a16="http://schemas.microsoft.com/office/drawing/2014/main" xmlns="" id="{5FE08D2D-4F03-41CC-AD0D-5190FAF835C5}"/>
               </a:ext>
             </a:extLst>
           </p:cNvPr>
@@ -11034,8 +11678,8 @@
         </p:nvSpPr>
         <p:spPr>
           <a:xfrm>
-            <a:off x="0" y="907224"/>
-            <a:ext cx="7045696" cy="6001643"/>
+            <a:off x="0" y="1294686"/>
+            <a:ext cx="7045696" cy="4893647"/>
           </a:xfrm>
           <a:prstGeom prst="rect">
             <a:avLst/>
@@ -11067,58 +11711,115 @@
           </a:p>
           <a:p>
             <a:r>
-              <a:rPr lang="en-US" sz="2400" dirty="0"/>
-              <a:t>SELECT * FROM</a:t>
-            </a:r>
-          </a:p>
-          <a:p>
-            <a:r>
-              <a:rPr lang="en-US" sz="2400" dirty="0"/>
-              <a:t>  (</a:t>
-            </a:r>
-          </a:p>
-          <a:p>
-            <a:r>
-              <a:rPr lang="en-US" sz="2400" dirty="0"/>
-              <a:t>  SELECT symbol, max(high)-min(low) AS growth</a:t>
-            </a:r>
-          </a:p>
-          <a:p>
-            <a:r>
-              <a:rPr lang="en-US" sz="2400" dirty="0"/>
-              <a:t>  FROM </a:t>
-            </a:r>
-            <a:r>
-              <a:rPr lang="en-US" sz="2400" dirty="0" err="1"/>
+              <a:rPr lang="en-US" sz="2400" dirty="0">
+                <a:latin typeface="Courier New" charset="0"/>
+                <a:ea typeface="Courier New" charset="0"/>
+                <a:cs typeface="Courier New" charset="0"/>
+              </a:rPr>
+              <a:t>SELECT symbol, </a:t>
+            </a:r>
+            <a:r>
+              <a:rPr lang="en-US" sz="2400" dirty="0" err="1">
+                <a:latin typeface="Courier New" charset="0"/>
+                <a:ea typeface="Courier New" charset="0"/>
+                <a:cs typeface="Courier New" charset="0"/>
+              </a:rPr>
+              <a:t>stddev</a:t>
+            </a:r>
+            <a:r>
+              <a:rPr lang="en-US" sz="2400" dirty="0">
+                <a:latin typeface="Courier New" charset="0"/>
+                <a:ea typeface="Courier New" charset="0"/>
+                <a:cs typeface="Courier New" charset="0"/>
+              </a:rPr>
+              <a:t>(high) as SD, max(high) - min(low) as growth   	FROM </a:t>
+            </a:r>
+            <a:r>
+              <a:rPr lang="en-US" sz="2400" dirty="0" err="1">
+                <a:latin typeface="Courier New" charset="0"/>
+                <a:ea typeface="Courier New" charset="0"/>
+                <a:cs typeface="Courier New" charset="0"/>
+              </a:rPr>
               <a:t>prices_split</a:t>
             </a:r>
-            <a:endParaRPr lang="en-US" sz="2400" dirty="0"/>
-          </a:p>
-          <a:p>
-            <a:r>
-              <a:rPr lang="en-US" sz="2400" dirty="0"/>
-              <a:t>  GROUP BY symbol</a:t>
-            </a:r>
-          </a:p>
-          <a:p>
-            <a:r>
-              <a:rPr lang="en-US" sz="2400" dirty="0"/>
-              <a:t>  ) </a:t>
-            </a:r>
-          </a:p>
-          <a:p>
-            <a:r>
-              <a:rPr lang="en-US" sz="2400" dirty="0"/>
-              <a:t>AS </a:t>
-            </a:r>
-            <a:r>
-              <a:rPr lang="en-US" sz="2400" dirty="0" err="1"/>
-              <a:t>subTable</a:t>
-            </a:r>
-            <a:r>
-              <a:rPr lang="en-US" sz="2400" dirty="0"/>
-              <a:t> ORDER BY growth ASC LIMIT 1;</a:t>
-            </a:r>
+            <a:r>
+              <a:rPr lang="en-US" sz="2400" dirty="0">
+                <a:latin typeface="Courier New" charset="0"/>
+                <a:ea typeface="Courier New" charset="0"/>
+                <a:cs typeface="Courier New" charset="0"/>
+              </a:rPr>
+              <a:t>     </a:t>
+            </a:r>
+            <a:endParaRPr lang="en-US" sz="2400" dirty="0" smtClean="0">
+              <a:latin typeface="Courier New" charset="0"/>
+              <a:ea typeface="Courier New" charset="0"/>
+              <a:cs typeface="Courier New" charset="0"/>
+            </a:endParaRPr>
+          </a:p>
+          <a:p>
+            <a:r>
+              <a:rPr lang="en-US" sz="2400" dirty="0">
+                <a:latin typeface="Courier New" charset="0"/>
+                <a:ea typeface="Courier New" charset="0"/>
+                <a:cs typeface="Courier New" charset="0"/>
+              </a:rPr>
+              <a:t>	</a:t>
+            </a:r>
+            <a:r>
+              <a:rPr lang="en-US" sz="2400" dirty="0" smtClean="0">
+                <a:latin typeface="Courier New" charset="0"/>
+                <a:ea typeface="Courier New" charset="0"/>
+                <a:cs typeface="Courier New" charset="0"/>
+              </a:rPr>
+              <a:t>GROUP </a:t>
+            </a:r>
+            <a:r>
+              <a:rPr lang="en-US" sz="2400" dirty="0">
+                <a:latin typeface="Courier New" charset="0"/>
+                <a:ea typeface="Courier New" charset="0"/>
+                <a:cs typeface="Courier New" charset="0"/>
+              </a:rPr>
+              <a:t>BY </a:t>
+            </a:r>
+            <a:r>
+              <a:rPr lang="en-US" sz="2400" dirty="0" smtClean="0">
+                <a:latin typeface="Courier New" charset="0"/>
+                <a:ea typeface="Courier New" charset="0"/>
+                <a:cs typeface="Courier New" charset="0"/>
+              </a:rPr>
+              <a:t>symbol</a:t>
+            </a:r>
+          </a:p>
+          <a:p>
+            <a:r>
+              <a:rPr lang="en-US" sz="2400" dirty="0">
+                <a:latin typeface="Courier New" charset="0"/>
+                <a:ea typeface="Courier New" charset="0"/>
+                <a:cs typeface="Courier New" charset="0"/>
+              </a:rPr>
+              <a:t>	</a:t>
+            </a:r>
+            <a:r>
+              <a:rPr lang="en-US" sz="2400" dirty="0" smtClean="0">
+                <a:latin typeface="Courier New" charset="0"/>
+                <a:ea typeface="Courier New" charset="0"/>
+                <a:cs typeface="Courier New" charset="0"/>
+              </a:rPr>
+              <a:t>ORDER </a:t>
+            </a:r>
+            <a:r>
+              <a:rPr lang="en-US" sz="2400" dirty="0">
+                <a:latin typeface="Courier New" charset="0"/>
+                <a:ea typeface="Courier New" charset="0"/>
+                <a:cs typeface="Courier New" charset="0"/>
+              </a:rPr>
+              <a:t>BY SD DESC LIMIT 10;</a:t>
+            </a:r>
+            <a:endParaRPr lang="en-US" sz="2400" dirty="0">
+              <a:latin typeface="Courier New" charset="0"/>
+              <a:ea typeface="Courier New" charset="0"/>
+              <a:cs typeface="Courier New" charset="0"/>
+            </a:endParaRPr>
           </a:p>
         </p:txBody>
       </p:sp>
@@ -11127,7 +11828,7 @@
           <p:cNvPr id="4" name="Picture 3">
             <a:extLst>
               <a:ext uri="{FF2B5EF4-FFF2-40B4-BE49-F238E27FC236}">
-                <a16:creationId xmlns:a16="http://schemas.microsoft.com/office/drawing/2014/main" id="{CA12F6A2-5AB2-4D88-81F2-9522E2AC6DA3}"/>
+                <a16:creationId xmlns:a16="http://schemas.microsoft.com/office/drawing/2014/main" xmlns="" id="{CA12F6A2-5AB2-4D88-81F2-9522E2AC6DA3}"/>
               </a:ext>
             </a:extLst>
           </p:cNvPr>
@@ -11135,7 +11836,7 @@
           <p:nvPr/>
         </p:nvPicPr>
         <p:blipFill>
-          <a:blip r:embed="rId2">
+          <a:blip r:embed="rId3">
             <a:extLst>
               <a:ext uri="{28A0092B-C50C-407E-A947-70E740481C1C}">
                 <a14:useLocalDpi xmlns:a14="http://schemas.microsoft.com/office/drawing/2010/main" val="0"/>
@@ -11433,4 +12134,265 @@
     </a:ext>
   </a:extLst>
 </a:theme>
+</file>
+
+<file path=ppt/theme/theme2.xml><?xml version="1.0" encoding="utf-8"?>
+<a:theme xmlns:a="http://schemas.openxmlformats.org/drawingml/2006/main" name="Office Theme">
+  <a:themeElements>
+    <a:clrScheme name="Office">
+      <a:dk1>
+        <a:sysClr val="windowText" lastClr="000000"/>
+      </a:dk1>
+      <a:lt1>
+        <a:sysClr val="window" lastClr="FFFFFF"/>
+      </a:lt1>
+      <a:dk2>
+        <a:srgbClr val="44546A"/>
+      </a:dk2>
+      <a:lt2>
+        <a:srgbClr val="E7E6E6"/>
+      </a:lt2>
+      <a:accent1>
+        <a:srgbClr val="4472C4"/>
+      </a:accent1>
+      <a:accent2>
+        <a:srgbClr val="ED7D31"/>
+      </a:accent2>
+      <a:accent3>
+        <a:srgbClr val="A5A5A5"/>
+      </a:accent3>
+      <a:accent4>
+        <a:srgbClr val="FFC000"/>
+      </a:accent4>
+      <a:accent5>
+        <a:srgbClr val="5B9BD5"/>
+      </a:accent5>
+      <a:accent6>
+        <a:srgbClr val="70AD47"/>
+      </a:accent6>
+      <a:hlink>
+        <a:srgbClr val="0563C1"/>
+      </a:hlink>
+      <a:folHlink>
+        <a:srgbClr val="954F72"/>
+      </a:folHlink>
+    </a:clrScheme>
+    <a:fontScheme name="Office">
+      <a:majorFont>
+        <a:latin typeface="Calibri Light" panose="020F0302020204030204"/>
+        <a:ea typeface=""/>
+        <a:cs typeface=""/>
+        <a:font script="Jpan" typeface="Yu Gothic Light"/>
+        <a:font script="Hang" typeface="맑은 고딕"/>
+        <a:font script="Hans" typeface="DengXian Light"/>
+        <a:font script="Hant" typeface="新細明體"/>
+        <a:font script="Arab" typeface="Times New Roman"/>
+        <a:font script="Hebr" typeface="Times New Roman"/>
+        <a:font script="Thai" typeface="Angsana New"/>
+        <a:font script="Ethi" typeface="Nyala"/>
+        <a:font script="Beng" typeface="Vrinda"/>
+        <a:font script="Gujr" typeface="Shruti"/>
+        <a:font script="Khmr" typeface="MoolBoran"/>
+        <a:font script="Knda" typeface="Tunga"/>
+        <a:font script="Guru" typeface="Raavi"/>
+        <a:font script="Cans" typeface="Euphemia"/>
+        <a:font script="Cher" typeface="Plantagenet Cherokee"/>
+        <a:font script="Yiii" typeface="Microsoft Yi Baiti"/>
+        <a:font script="Tibt" typeface="Microsoft Himalaya"/>
+        <a:font script="Thaa" typeface="MV Boli"/>
+        <a:font script="Deva" typeface="Mangal"/>
+        <a:font script="Telu" typeface="Gautami"/>
+        <a:font script="Taml" typeface="Latha"/>
+        <a:font script="Syrc" typeface="Estrangelo Edessa"/>
+        <a:font script="Orya" typeface="Kalinga"/>
+        <a:font script="Mlym" typeface="Kartika"/>
+        <a:font script="Laoo" typeface="DokChampa"/>
+        <a:font script="Sinh" typeface="Iskoola Pota"/>
+        <a:font script="Mong" typeface="Mongolian Baiti"/>
+        <a:font script="Viet" typeface="Times New Roman"/>
+        <a:font script="Uigh" typeface="Microsoft Uighur"/>
+        <a:font script="Geor" typeface="Sylfaen"/>
+      </a:majorFont>
+      <a:minorFont>
+        <a:latin typeface="Calibri" panose="020F0502020204030204"/>
+        <a:ea typeface=""/>
+        <a:cs typeface=""/>
+        <a:font script="Jpan" typeface="Yu Gothic"/>
+        <a:font script="Hang" typeface="맑은 고딕"/>
+        <a:font script="Hans" typeface="DengXian"/>
+        <a:font script="Hant" typeface="新細明體"/>
+        <a:font script="Arab" typeface="Arial"/>
+        <a:font script="Hebr" typeface="Arial"/>
+        <a:font script="Thai" typeface="Cordia New"/>
+        <a:font script="Ethi" typeface="Nyala"/>
+        <a:font script="Beng" typeface="Vrinda"/>
+        <a:font script="Gujr" typeface="Shruti"/>
+        <a:font script="Khmr" typeface="DaunPenh"/>
+        <a:font script="Knda" typeface="Tunga"/>
+        <a:font script="Guru" typeface="Raavi"/>
+        <a:font script="Cans" typeface="Euphemia"/>
+        <a:font script="Cher" typeface="Plantagenet Cherokee"/>
+        <a:font script="Yiii" typeface="Microsoft Yi Baiti"/>
+        <a:font script="Tibt" typeface="Microsoft Himalaya"/>
+        <a:font script="Thaa" typeface="MV Boli"/>
+        <a:font script="Deva" typeface="Mangal"/>
+        <a:font script="Telu" typeface="Gautami"/>
+        <a:font script="Taml" typeface="Latha"/>
+        <a:font script="Syrc" typeface="Estrangelo Edessa"/>
+        <a:font script="Orya" typeface="Kalinga"/>
+        <a:font script="Mlym" typeface="Kartika"/>
+        <a:font script="Laoo" typeface="DokChampa"/>
+        <a:font script="Sinh" typeface="Iskoola Pota"/>
+        <a:font script="Mong" typeface="Mongolian Baiti"/>
+        <a:font script="Viet" typeface="Arial"/>
+        <a:font script="Uigh" typeface="Microsoft Uighur"/>
+        <a:font script="Geor" typeface="Sylfaen"/>
+      </a:minorFont>
+    </a:fontScheme>
+    <a:fmtScheme name="Office">
+      <a:fillStyleLst>
+        <a:solidFill>
+          <a:schemeClr val="phClr"/>
+        </a:solidFill>
+        <a:gradFill rotWithShape="1">
+          <a:gsLst>
+            <a:gs pos="0">
+              <a:schemeClr val="phClr">
+                <a:lumMod val="110000"/>
+                <a:satMod val="105000"/>
+                <a:tint val="67000"/>
+              </a:schemeClr>
+            </a:gs>
+            <a:gs pos="50000">
+              <a:schemeClr val="phClr">
+                <a:lumMod val="105000"/>
+                <a:satMod val="103000"/>
+                <a:tint val="73000"/>
+              </a:schemeClr>
+            </a:gs>
+            <a:gs pos="100000">
+              <a:schemeClr val="phClr">
+                <a:lumMod val="105000"/>
+                <a:satMod val="109000"/>
+                <a:tint val="81000"/>
+              </a:schemeClr>
+            </a:gs>
+          </a:gsLst>
+          <a:lin ang="5400000" scaled="0"/>
+        </a:gradFill>
+        <a:gradFill rotWithShape="1">
+          <a:gsLst>
+            <a:gs pos="0">
+              <a:schemeClr val="phClr">
+                <a:satMod val="103000"/>
+                <a:lumMod val="102000"/>
+                <a:tint val="94000"/>
+              </a:schemeClr>
+            </a:gs>
+            <a:gs pos="50000">
+              <a:schemeClr val="phClr">
+                <a:satMod val="110000"/>
+                <a:lumMod val="100000"/>
+                <a:shade val="100000"/>
+              </a:schemeClr>
+            </a:gs>
+            <a:gs pos="100000">
+              <a:schemeClr val="phClr">
+                <a:lumMod val="99000"/>
+                <a:satMod val="120000"/>
+                <a:shade val="78000"/>
+              </a:schemeClr>
+            </a:gs>
+          </a:gsLst>
+          <a:lin ang="5400000" scaled="0"/>
+        </a:gradFill>
+      </a:fillStyleLst>
+      <a:lnStyleLst>
+        <a:ln w="6350" cap="flat" cmpd="sng" algn="ctr">
+          <a:solidFill>
+            <a:schemeClr val="phClr"/>
+          </a:solidFill>
+          <a:prstDash val="solid"/>
+          <a:miter lim="800000"/>
+        </a:ln>
+        <a:ln w="12700" cap="flat" cmpd="sng" algn="ctr">
+          <a:solidFill>
+            <a:schemeClr val="phClr"/>
+          </a:solidFill>
+          <a:prstDash val="solid"/>
+          <a:miter lim="800000"/>
+        </a:ln>
+        <a:ln w="19050" cap="flat" cmpd="sng" algn="ctr">
+          <a:solidFill>
+            <a:schemeClr val="phClr"/>
+          </a:solidFill>
+          <a:prstDash val="solid"/>
+          <a:miter lim="800000"/>
+        </a:ln>
+      </a:lnStyleLst>
+      <a:effectStyleLst>
+        <a:effectStyle>
+          <a:effectLst/>
+        </a:effectStyle>
+        <a:effectStyle>
+          <a:effectLst/>
+        </a:effectStyle>
+        <a:effectStyle>
+          <a:effectLst>
+            <a:outerShdw blurRad="57150" dist="19050" dir="5400000" algn="ctr" rotWithShape="0">
+              <a:srgbClr val="000000">
+                <a:alpha val="63000"/>
+              </a:srgbClr>
+            </a:outerShdw>
+          </a:effectLst>
+        </a:effectStyle>
+      </a:effectStyleLst>
+      <a:bgFillStyleLst>
+        <a:solidFill>
+          <a:schemeClr val="phClr"/>
+        </a:solidFill>
+        <a:solidFill>
+          <a:schemeClr val="phClr">
+            <a:tint val="95000"/>
+            <a:satMod val="170000"/>
+          </a:schemeClr>
+        </a:solidFill>
+        <a:gradFill rotWithShape="1">
+          <a:gsLst>
+            <a:gs pos="0">
+              <a:schemeClr val="phClr">
+                <a:tint val="93000"/>
+                <a:satMod val="150000"/>
+                <a:shade val="98000"/>
+                <a:lumMod val="102000"/>
+              </a:schemeClr>
+            </a:gs>
+            <a:gs pos="50000">
+              <a:schemeClr val="phClr">
+                <a:tint val="98000"/>
+                <a:satMod val="130000"/>
+                <a:shade val="90000"/>
+                <a:lumMod val="103000"/>
+              </a:schemeClr>
+            </a:gs>
+            <a:gs pos="100000">
+              <a:schemeClr val="phClr">
+                <a:shade val="63000"/>
+                <a:satMod val="120000"/>
+              </a:schemeClr>
+            </a:gs>
+          </a:gsLst>
+          <a:lin ang="5400000" scaled="0"/>
+        </a:gradFill>
+      </a:bgFillStyleLst>
+    </a:fmtScheme>
+  </a:themeElements>
+  <a:objectDefaults/>
+  <a:extraClrSchemeLst/>
+  <a:extLst>
+    <a:ext uri="{05A4C25C-085E-4340-85A3-A5531E510DB2}">
+      <thm15:themeFamily xmlns:thm15="http://schemas.microsoft.com/office/thememl/2012/main" name="Office Theme" id="{62F939B6-93AF-4DB8-9C6B-D6C7DFDC589F}" vid="{4A3C46E8-61CC-4603-A589-7422A47A8E4A}"/>
+    </a:ext>
+  </a:extLst>
+</a:theme>
 </file>
</xml_diff>